<commit_message>
docs/images: Update user session activity diagram
Updated the diagram due to change in how the logic is handled.
</commit_message>
<xml_diff>
--- a/docs/diagrams/UserSessionActivityDiagram.pptx
+++ b/docs/diagrams/UserSessionActivityDiagram.pptx
@@ -261,7 +261,7 @@
           <a:p>
             <a:fld id="{542F47FF-5056-41FF-A1F8-23A414798AA4}" type="datetimeFigureOut">
               <a:rPr lang="en-SG" smtClean="0"/>
-              <a:t>18/10/2018</a:t>
+              <a:t>11/11/2018</a:t>
             </a:fld>
             <a:endParaRPr lang="en-SG"/>
           </a:p>
@@ -461,7 +461,7 @@
           <a:p>
             <a:fld id="{542F47FF-5056-41FF-A1F8-23A414798AA4}" type="datetimeFigureOut">
               <a:rPr lang="en-SG" smtClean="0"/>
-              <a:t>18/10/2018</a:t>
+              <a:t>11/11/2018</a:t>
             </a:fld>
             <a:endParaRPr lang="en-SG"/>
           </a:p>
@@ -671,7 +671,7 @@
           <a:p>
             <a:fld id="{542F47FF-5056-41FF-A1F8-23A414798AA4}" type="datetimeFigureOut">
               <a:rPr lang="en-SG" smtClean="0"/>
-              <a:t>18/10/2018</a:t>
+              <a:t>11/11/2018</a:t>
             </a:fld>
             <a:endParaRPr lang="en-SG"/>
           </a:p>
@@ -871,7 +871,7 @@
           <a:p>
             <a:fld id="{542F47FF-5056-41FF-A1F8-23A414798AA4}" type="datetimeFigureOut">
               <a:rPr lang="en-SG" smtClean="0"/>
-              <a:t>18/10/2018</a:t>
+              <a:t>11/11/2018</a:t>
             </a:fld>
             <a:endParaRPr lang="en-SG"/>
           </a:p>
@@ -1147,7 +1147,7 @@
           <a:p>
             <a:fld id="{542F47FF-5056-41FF-A1F8-23A414798AA4}" type="datetimeFigureOut">
               <a:rPr lang="en-SG" smtClean="0"/>
-              <a:t>18/10/2018</a:t>
+              <a:t>11/11/2018</a:t>
             </a:fld>
             <a:endParaRPr lang="en-SG"/>
           </a:p>
@@ -1415,7 +1415,7 @@
           <a:p>
             <a:fld id="{542F47FF-5056-41FF-A1F8-23A414798AA4}" type="datetimeFigureOut">
               <a:rPr lang="en-SG" smtClean="0"/>
-              <a:t>18/10/2018</a:t>
+              <a:t>11/11/2018</a:t>
             </a:fld>
             <a:endParaRPr lang="en-SG"/>
           </a:p>
@@ -1830,7 +1830,7 @@
           <a:p>
             <a:fld id="{542F47FF-5056-41FF-A1F8-23A414798AA4}" type="datetimeFigureOut">
               <a:rPr lang="en-SG" smtClean="0"/>
-              <a:t>18/10/2018</a:t>
+              <a:t>11/11/2018</a:t>
             </a:fld>
             <a:endParaRPr lang="en-SG"/>
           </a:p>
@@ -1972,7 +1972,7 @@
           <a:p>
             <a:fld id="{542F47FF-5056-41FF-A1F8-23A414798AA4}" type="datetimeFigureOut">
               <a:rPr lang="en-SG" smtClean="0"/>
-              <a:t>18/10/2018</a:t>
+              <a:t>11/11/2018</a:t>
             </a:fld>
             <a:endParaRPr lang="en-SG"/>
           </a:p>
@@ -2085,7 +2085,7 @@
           <a:p>
             <a:fld id="{542F47FF-5056-41FF-A1F8-23A414798AA4}" type="datetimeFigureOut">
               <a:rPr lang="en-SG" smtClean="0"/>
-              <a:t>18/10/2018</a:t>
+              <a:t>11/11/2018</a:t>
             </a:fld>
             <a:endParaRPr lang="en-SG"/>
           </a:p>
@@ -2398,7 +2398,7 @@
           <a:p>
             <a:fld id="{542F47FF-5056-41FF-A1F8-23A414798AA4}" type="datetimeFigureOut">
               <a:rPr lang="en-SG" smtClean="0"/>
-              <a:t>18/10/2018</a:t>
+              <a:t>11/11/2018</a:t>
             </a:fld>
             <a:endParaRPr lang="en-SG"/>
           </a:p>
@@ -2687,7 +2687,7 @@
           <a:p>
             <a:fld id="{542F47FF-5056-41FF-A1F8-23A414798AA4}" type="datetimeFigureOut">
               <a:rPr lang="en-SG" smtClean="0"/>
-              <a:t>18/10/2018</a:t>
+              <a:t>11/11/2018</a:t>
             </a:fld>
             <a:endParaRPr lang="en-SG"/>
           </a:p>
@@ -2930,7 +2930,7 @@
           <a:p>
             <a:fld id="{542F47FF-5056-41FF-A1F8-23A414798AA4}" type="datetimeFigureOut">
               <a:rPr lang="en-SG" smtClean="0"/>
-              <a:t>18/10/2018</a:t>
+              <a:t>11/11/2018</a:t>
             </a:fld>
             <a:endParaRPr lang="en-SG"/>
           </a:p>
@@ -3616,7 +3616,14 @@
             <a:pPr algn="ctr"/>
             <a:r>
               <a:rPr lang="en-SG" sz="1801" dirty="0"/>
-              <a:t>Store account username in session and update GUI</a:t>
+              <a:t>Store account in session </a:t>
+            </a:r>
+            <a:br>
+              <a:rPr lang="en-SG" sz="1801" dirty="0"/>
+            </a:br>
+            <a:r>
+              <a:rPr lang="en-SG" sz="1801" dirty="0"/>
+              <a:t>and update GUI</a:t>
             </a:r>
           </a:p>
         </p:txBody>

</xml_diff>

<commit_message>
docs/diagrams: Update user session activity diagram
</commit_message>
<xml_diff>
--- a/docs/diagrams/UserSessionActivityDiagram.pptx
+++ b/docs/diagrams/UserSessionActivityDiagram.pptx
@@ -3361,7 +3361,7 @@
         </p:nvSpPr>
         <p:spPr>
           <a:xfrm>
-            <a:off x="2680041" y="3197106"/>
+            <a:off x="2511341" y="3346997"/>
             <a:ext cx="235669" cy="235669"/>
           </a:xfrm>
           <a:prstGeom prst="ellipse">
@@ -3414,8 +3414,8 @@
         </p:nvCxnSpPr>
         <p:spPr>
           <a:xfrm>
-            <a:off x="2915710" y="3314941"/>
-            <a:ext cx="227605" cy="839"/>
+            <a:off x="2747010" y="3464832"/>
+            <a:ext cx="323257" cy="0"/>
           </a:xfrm>
           <a:prstGeom prst="straightConnector1">
             <a:avLst/>
@@ -3453,8 +3453,8 @@
         </p:nvSpPr>
         <p:spPr>
           <a:xfrm>
-            <a:off x="3143315" y="2957561"/>
-            <a:ext cx="1570355" cy="716437"/>
+            <a:off x="3070267" y="3106613"/>
+            <a:ext cx="2349458" cy="716437"/>
           </a:xfrm>
           <a:prstGeom prst="roundRect">
             <a:avLst/>
@@ -3486,7 +3486,27 @@
             <a:pPr algn="ctr"/>
             <a:r>
               <a:rPr lang="en-SG" sz="1801" dirty="0"/>
-              <a:t>Is user logging in?</a:t>
+              <a:t>User executes </a:t>
+            </a:r>
+            <a:r>
+              <a:rPr lang="en-SG" sz="1801" dirty="0">
+                <a:latin typeface="Consolas" panose="020B0609020204030204" pitchFamily="49" charset="0"/>
+              </a:rPr>
+              <a:t>login</a:t>
+            </a:r>
+            <a:r>
+              <a:rPr lang="en-SG" sz="1801" dirty="0"/>
+              <a:t> or </a:t>
+            </a:r>
+            <a:r>
+              <a:rPr lang="en-SG" sz="1801" dirty="0">
+                <a:latin typeface="Consolas" panose="020B0609020204030204" pitchFamily="49" charset="0"/>
+              </a:rPr>
+              <a:t>logout</a:t>
+            </a:r>
+            <a:r>
+              <a:rPr lang="en-SG" sz="1801" dirty="0"/>
+              <a:t> command</a:t>
             </a:r>
           </a:p>
         </p:txBody>
@@ -3509,8 +3529,8 @@
         </p:nvCxnSpPr>
         <p:spPr>
           <a:xfrm flipV="1">
-            <a:off x="4713670" y="3312830"/>
-            <a:ext cx="1043331" cy="2950"/>
+            <a:off x="5419725" y="3459338"/>
+            <a:ext cx="337276" cy="5494"/>
           </a:xfrm>
           <a:prstGeom prst="straightConnector1">
             <a:avLst/>
@@ -3536,54 +3556,19 @@
       </p:cxnSp>
       <p:sp>
         <p:nvSpPr>
-          <p:cNvPr id="47" name="TextBox 46">
-            <a:extLst>
-              <a:ext uri="{FF2B5EF4-FFF2-40B4-BE49-F238E27FC236}">
-                <a16:creationId xmlns:a16="http://schemas.microsoft.com/office/drawing/2014/main" id="{791A7435-1CBD-4D64-B373-CDF617409EFD}"/>
-              </a:ext>
-            </a:extLst>
-          </p:cNvPr>
-          <p:cNvSpPr txBox="1"/>
+          <p:cNvPr id="51" name="Rectangle: Rounded Corners 50">
+            <a:extLst>
+              <a:ext uri="{FF2B5EF4-FFF2-40B4-BE49-F238E27FC236}">
+                <a16:creationId xmlns:a16="http://schemas.microsoft.com/office/drawing/2014/main" id="{D62D81FC-C644-4602-90C8-B7974D14CA54}"/>
+              </a:ext>
+            </a:extLst>
+          </p:cNvPr>
+          <p:cNvSpPr/>
           <p:nvPr/>
         </p:nvSpPr>
         <p:spPr>
           <a:xfrm>
-            <a:off x="5345870" y="3793595"/>
-            <a:ext cx="853127" cy="369460"/>
-          </a:xfrm>
-          <a:prstGeom prst="rect">
-            <a:avLst/>
-          </a:prstGeom>
-          <a:noFill/>
-        </p:spPr>
-        <p:txBody>
-          <a:bodyPr wrap="square" rtlCol="0">
-            <a:spAutoFit/>
-          </a:bodyPr>
-          <a:lstStyle/>
-          <a:p>
-            <a:r>
-              <a:rPr lang="en-SG" sz="1801" dirty="0"/>
-              <a:t>[else]</a:t>
-            </a:r>
-          </a:p>
-        </p:txBody>
-      </p:sp>
-      <p:sp>
-        <p:nvSpPr>
-          <p:cNvPr id="51" name="Rectangle: Rounded Corners 50">
-            <a:extLst>
-              <a:ext uri="{FF2B5EF4-FFF2-40B4-BE49-F238E27FC236}">
-                <a16:creationId xmlns:a16="http://schemas.microsoft.com/office/drawing/2014/main" id="{D62D81FC-C644-4602-90C8-B7974D14CA54}"/>
-              </a:ext>
-            </a:extLst>
-          </p:cNvPr>
-          <p:cNvSpPr/>
-          <p:nvPr/>
-        </p:nvSpPr>
-        <p:spPr>
-          <a:xfrm>
-            <a:off x="6478151" y="2438400"/>
+            <a:off x="6478151" y="2562225"/>
             <a:ext cx="2953232" cy="814659"/>
           </a:xfrm>
           <a:prstGeom prst="roundRect">
@@ -3642,7 +3627,7 @@
         </p:nvSpPr>
         <p:spPr>
           <a:xfrm>
-            <a:off x="5757001" y="3072447"/>
+            <a:off x="5757001" y="3218955"/>
             <a:ext cx="480766" cy="480766"/>
           </a:xfrm>
           <a:prstGeom prst="diamond">
@@ -3691,7 +3676,7 @@
         </p:nvGrpSpPr>
         <p:grpSpPr>
           <a:xfrm>
-            <a:off x="9773226" y="3202660"/>
+            <a:off x="10154226" y="3950641"/>
             <a:ext cx="235669" cy="235669"/>
             <a:chOff x="8040730" y="5082186"/>
             <a:chExt cx="235669" cy="235669"/>
@@ -3803,50 +3788,15 @@
         <p:nvCxnSpPr>
           <p:cNvPr id="66" name="Elbow Connector 65"/>
           <p:cNvCxnSpPr>
+            <a:cxnSpLocks/>
             <a:stCxn id="56" idx="0"/>
           </p:cNvCxnSpPr>
           <p:nvPr/>
         </p:nvCxnSpPr>
         <p:spPr>
           <a:xfrm rot="5400000" flipH="1" flipV="1">
-            <a:off x="6123581" y="2716584"/>
-            <a:ext cx="229667" cy="482060"/>
-          </a:xfrm>
-          <a:prstGeom prst="bentConnector2">
-            <a:avLst/>
-          </a:prstGeom>
-          <a:ln>
-            <a:tailEnd type="triangle"/>
-          </a:ln>
-        </p:spPr>
-        <p:style>
-          <a:lnRef idx="1">
-            <a:schemeClr val="dk1"/>
-          </a:lnRef>
-          <a:fillRef idx="0">
-            <a:schemeClr val="dk1"/>
-          </a:fillRef>
-          <a:effectRef idx="0">
-            <a:schemeClr val="dk1"/>
-          </a:effectRef>
-          <a:fontRef idx="minor">
-            <a:schemeClr val="tx1"/>
-          </a:fontRef>
-        </p:style>
-      </p:cxnSp>
-      <p:cxnSp>
-        <p:nvCxnSpPr>
-          <p:cNvPr id="72" name="Elbow Connector 71"/>
-          <p:cNvCxnSpPr>
-            <a:cxnSpLocks/>
-            <a:stCxn id="56" idx="2"/>
-          </p:cNvCxnSpPr>
-          <p:nvPr/>
-        </p:nvCxnSpPr>
-        <p:spPr>
-          <a:xfrm rot="16200000" flipH="1">
-            <a:off x="6117576" y="3433020"/>
-            <a:ext cx="240384" cy="480769"/>
+            <a:off x="6112241" y="2851752"/>
+            <a:ext cx="252347" cy="482061"/>
           </a:xfrm>
           <a:prstGeom prst="bentConnector2">
             <a:avLst/>
@@ -3876,13 +3826,14 @@
           <p:cNvCxnSpPr>
             <a:cxnSpLocks/>
             <a:stCxn id="51" idx="3"/>
+            <a:endCxn id="68" idx="0"/>
           </p:cNvCxnSpPr>
           <p:nvPr/>
         </p:nvCxnSpPr>
         <p:spPr>
           <a:xfrm>
-            <a:off x="9431383" y="2845730"/>
-            <a:ext cx="459678" cy="229667"/>
+            <a:off x="9431383" y="2969555"/>
+            <a:ext cx="840678" cy="981086"/>
           </a:xfrm>
           <a:prstGeom prst="bentConnector2">
             <a:avLst/>
@@ -3920,7 +3871,7 @@
         </p:nvSpPr>
         <p:spPr>
           <a:xfrm>
-            <a:off x="6461518" y="3438329"/>
+            <a:off x="6478151" y="3661147"/>
             <a:ext cx="2953232" cy="814659"/>
           </a:xfrm>
           <a:prstGeom prst="roundRect">
@@ -3958,30 +3909,142 @@
           </a:p>
         </p:txBody>
       </p:sp>
+      <p:sp>
+        <p:nvSpPr>
+          <p:cNvPr id="30" name="TextBox 29">
+            <a:extLst>
+              <a:ext uri="{FF2B5EF4-FFF2-40B4-BE49-F238E27FC236}">
+                <a16:creationId xmlns:a16="http://schemas.microsoft.com/office/drawing/2014/main" id="{78592B05-BAD7-4A6A-9ADE-C7E266F81112}"/>
+              </a:ext>
+            </a:extLst>
+          </p:cNvPr>
+          <p:cNvSpPr txBox="1"/>
+          <p:nvPr/>
+        </p:nvSpPr>
+        <p:spPr>
+          <a:xfrm>
+            <a:off x="4967820" y="2567572"/>
+            <a:ext cx="1492060" cy="369460"/>
+          </a:xfrm>
+          <a:prstGeom prst="rect">
+            <a:avLst/>
+          </a:prstGeom>
+          <a:noFill/>
+        </p:spPr>
+        <p:txBody>
+          <a:bodyPr wrap="square" rtlCol="0">
+            <a:spAutoFit/>
+          </a:bodyPr>
+          <a:lstStyle/>
+          <a:p>
+            <a:r>
+              <a:rPr lang="en-SG" sz="1801" dirty="0"/>
+              <a:t>[User logs in]</a:t>
+            </a:r>
+          </a:p>
+        </p:txBody>
+      </p:sp>
+      <p:sp>
+        <p:nvSpPr>
+          <p:cNvPr id="40" name="TextBox 39">
+            <a:extLst>
+              <a:ext uri="{FF2B5EF4-FFF2-40B4-BE49-F238E27FC236}">
+                <a16:creationId xmlns:a16="http://schemas.microsoft.com/office/drawing/2014/main" id="{0E2E3918-C52F-4E91-863B-526A2846FB68}"/>
+              </a:ext>
+            </a:extLst>
+          </p:cNvPr>
+          <p:cNvSpPr txBox="1"/>
+          <p:nvPr/>
+        </p:nvSpPr>
+        <p:spPr>
+          <a:xfrm>
+            <a:off x="5260013" y="3908247"/>
+            <a:ext cx="742152" cy="369460"/>
+          </a:xfrm>
+          <a:prstGeom prst="rect">
+            <a:avLst/>
+          </a:prstGeom>
+          <a:noFill/>
+        </p:spPr>
+        <p:txBody>
+          <a:bodyPr wrap="square" rtlCol="0">
+            <a:spAutoFit/>
+          </a:bodyPr>
+          <a:lstStyle/>
+          <a:p>
+            <a:r>
+              <a:rPr lang="en-SG" sz="1801" dirty="0"/>
+              <a:t>[else]</a:t>
+            </a:r>
+          </a:p>
+        </p:txBody>
+      </p:sp>
       <p:cxnSp>
         <p:nvCxnSpPr>
-          <p:cNvPr id="28" name="Elbow Connector 73">
-            <a:extLst>
-              <a:ext uri="{FF2B5EF4-FFF2-40B4-BE49-F238E27FC236}">
-                <a16:creationId xmlns:a16="http://schemas.microsoft.com/office/drawing/2014/main" id="{3B939113-3411-49B8-AB95-370DFE8B090D}"/>
+          <p:cNvPr id="45" name="Straight Arrow Connector 44">
+            <a:extLst>
+              <a:ext uri="{FF2B5EF4-FFF2-40B4-BE49-F238E27FC236}">
+                <a16:creationId xmlns:a16="http://schemas.microsoft.com/office/drawing/2014/main" id="{A9FBF5D8-1F04-4EB9-ADC5-0EDF7E1BA320}"/>
               </a:ext>
             </a:extLst>
           </p:cNvPr>
           <p:cNvCxnSpPr>
             <a:cxnSpLocks/>
             <a:stCxn id="19" idx="3"/>
+            <a:endCxn id="68" idx="2"/>
           </p:cNvCxnSpPr>
           <p:nvPr/>
         </p:nvCxnSpPr>
         <p:spPr>
           <a:xfrm flipV="1">
-            <a:off x="9414750" y="3565593"/>
-            <a:ext cx="474194" cy="280066"/>
+            <a:off x="9431383" y="4068476"/>
+            <a:ext cx="722843" cy="1"/>
           </a:xfrm>
-          <a:prstGeom prst="bentConnector3">
-            <a:avLst>
-              <a:gd name="adj1" fmla="val 100886"/>
-            </a:avLst>
+          <a:prstGeom prst="straightConnector1">
+            <a:avLst/>
+          </a:prstGeom>
+          <a:ln>
+            <a:tailEnd type="triangle"/>
+          </a:ln>
+        </p:spPr>
+        <p:style>
+          <a:lnRef idx="1">
+            <a:schemeClr val="dk1"/>
+          </a:lnRef>
+          <a:fillRef idx="0">
+            <a:schemeClr val="dk1"/>
+          </a:fillRef>
+          <a:effectRef idx="0">
+            <a:schemeClr val="dk1"/>
+          </a:effectRef>
+          <a:fontRef idx="minor">
+            <a:schemeClr val="tx1"/>
+          </a:fontRef>
+        </p:style>
+      </p:cxnSp>
+      <p:cxnSp>
+        <p:nvCxnSpPr>
+          <p:cNvPr id="77" name="Elbow Connector 65">
+            <a:extLst>
+              <a:ext uri="{FF2B5EF4-FFF2-40B4-BE49-F238E27FC236}">
+                <a16:creationId xmlns:a16="http://schemas.microsoft.com/office/drawing/2014/main" id="{5F3E8DBD-F3E7-46B5-89B4-C22221658FF9}"/>
+              </a:ext>
+            </a:extLst>
+          </p:cNvPr>
+          <p:cNvCxnSpPr>
+            <a:cxnSpLocks/>
+            <a:stCxn id="56" idx="2"/>
+            <a:endCxn id="19" idx="1"/>
+          </p:cNvCxnSpPr>
+          <p:nvPr/>
+        </p:nvCxnSpPr>
+        <p:spPr>
+          <a:xfrm rot="16200000" flipH="1">
+            <a:off x="6053389" y="3643715"/>
+            <a:ext cx="368756" cy="480767"/>
+          </a:xfrm>
+          <a:prstGeom prst="bentConnector2">
+            <a:avLst/>
           </a:prstGeom>
           <a:ln>
             <a:tailEnd type="triangle"/>

</xml_diff>